<commit_message>
Slides for IETF 109 (short version for inclusion into slides for Design Team Update, longer version for info and discussion)
</commit_message>
<xml_diff>
--- a/slides/slides-109-BRSKI-AE-fries.pptx
+++ b/slides/slides-109-BRSKI-AE-fries.pptx
@@ -5,17 +5,18 @@
     <p:sldMasterId id="2147483663" r:id="rId1"/>
   </p:sldMasterIdLst>
   <p:notesMasterIdLst>
-    <p:notesMasterId r:id="rId10"/>
+    <p:notesMasterId r:id="rId11"/>
   </p:notesMasterIdLst>
   <p:sldIdLst>
     <p:sldId id="256" r:id="rId2"/>
     <p:sldId id="273" r:id="rId3"/>
     <p:sldId id="288" r:id="rId4"/>
-    <p:sldId id="266" r:id="rId5"/>
-    <p:sldId id="287" r:id="rId6"/>
-    <p:sldId id="278" r:id="rId7"/>
-    <p:sldId id="283" r:id="rId8"/>
-    <p:sldId id="285" r:id="rId9"/>
+    <p:sldId id="289" r:id="rId5"/>
+    <p:sldId id="266" r:id="rId6"/>
+    <p:sldId id="287" r:id="rId7"/>
+    <p:sldId id="278" r:id="rId8"/>
+    <p:sldId id="283" r:id="rId9"/>
+    <p:sldId id="285" r:id="rId10"/>
   </p:sldIdLst>
   <p:sldSz cx="12192000" cy="6858000"/>
   <p:notesSz cx="6858000" cy="9144000"/>
@@ -216,7 +217,7 @@
           <a:p>
             <a:fld id="{33B5B5E8-CA78-4A82-83A0-867EF5A818AE}" type="datetimeFigureOut">
               <a:rPr lang="en-US" smtClean="0"/>
-              <a:t>11/9/2020</a:t>
+              <a:t>11/12/2020</a:t>
             </a:fld>
             <a:endParaRPr lang="en-US"/>
           </a:p>
@@ -725,7 +726,7 @@
     </p:spTree>
     <p:extLst>
       <p:ext uri="{BB962C8B-B14F-4D97-AF65-F5344CB8AC3E}">
-        <p14:creationId xmlns:p14="http://schemas.microsoft.com/office/powerpoint/2010/main" val="1399923938"/>
+        <p14:creationId xmlns:p14="http://schemas.microsoft.com/office/powerpoint/2010/main" val="1667908116"/>
       </p:ext>
     </p:extLst>
   </p:cSld>
@@ -809,7 +810,7 @@
     </p:spTree>
     <p:extLst>
       <p:ext uri="{BB962C8B-B14F-4D97-AF65-F5344CB8AC3E}">
-        <p14:creationId xmlns:p14="http://schemas.microsoft.com/office/powerpoint/2010/main" val="4184775143"/>
+        <p14:creationId xmlns:p14="http://schemas.microsoft.com/office/powerpoint/2010/main" val="1399923938"/>
       </p:ext>
     </p:extLst>
   </p:cSld>
@@ -893,7 +894,7 @@
     </p:spTree>
     <p:extLst>
       <p:ext uri="{BB962C8B-B14F-4D97-AF65-F5344CB8AC3E}">
-        <p14:creationId xmlns:p14="http://schemas.microsoft.com/office/powerpoint/2010/main" val="1399923938"/>
+        <p14:creationId xmlns:p14="http://schemas.microsoft.com/office/powerpoint/2010/main" val="4184775143"/>
       </p:ext>
     </p:extLst>
   </p:cSld>
@@ -977,7 +978,7 @@
     </p:spTree>
     <p:extLst>
       <p:ext uri="{BB962C8B-B14F-4D97-AF65-F5344CB8AC3E}">
-        <p14:creationId xmlns:p14="http://schemas.microsoft.com/office/powerpoint/2010/main" val="2430214839"/>
+        <p14:creationId xmlns:p14="http://schemas.microsoft.com/office/powerpoint/2010/main" val="1399923938"/>
       </p:ext>
     </p:extLst>
   </p:cSld>
@@ -1053,6 +1054,90 @@
             <a:fld id="{4C6D392E-C4EF-4AC5-9CF0-E17168E17BBE}" type="slidenum">
               <a:rPr lang="en-US" smtClean="0"/>
               <a:t>8</a:t>
+            </a:fld>
+            <a:endParaRPr lang="en-US"/>
+          </a:p>
+        </p:txBody>
+      </p:sp>
+    </p:spTree>
+    <p:extLst>
+      <p:ext uri="{BB962C8B-B14F-4D97-AF65-F5344CB8AC3E}">
+        <p14:creationId xmlns:p14="http://schemas.microsoft.com/office/powerpoint/2010/main" val="2430214839"/>
+      </p:ext>
+    </p:extLst>
+  </p:cSld>
+  <p:clrMapOvr>
+    <a:masterClrMapping/>
+  </p:clrMapOvr>
+</p:notes>
+</file>
+
+<file path=ppt/notesSlides/notesSlide8.xml><?xml version="1.0" encoding="utf-8"?>
+<p:notes xmlns:a="http://schemas.openxmlformats.org/drawingml/2006/main" xmlns:r="http://schemas.openxmlformats.org/officeDocument/2006/relationships" xmlns:p="http://schemas.openxmlformats.org/presentationml/2006/main">
+  <p:cSld>
+    <p:spTree>
+      <p:nvGrpSpPr>
+        <p:cNvPr id="1" name=""/>
+        <p:cNvGrpSpPr/>
+        <p:nvPr/>
+      </p:nvGrpSpPr>
+      <p:grpSpPr>
+        <a:xfrm>
+          <a:off x="0" y="0"/>
+          <a:ext cx="0" cy="0"/>
+          <a:chOff x="0" y="0"/>
+          <a:chExt cx="0" cy="0"/>
+        </a:xfrm>
+      </p:grpSpPr>
+      <p:sp>
+        <p:nvSpPr>
+          <p:cNvPr id="2" name="Slide Image Placeholder 1"/>
+          <p:cNvSpPr>
+            <a:spLocks noGrp="1" noRot="1" noChangeAspect="1"/>
+          </p:cNvSpPr>
+          <p:nvPr>
+            <p:ph type="sldImg"/>
+          </p:nvPr>
+        </p:nvSpPr>
+        <p:spPr/>
+      </p:sp>
+      <p:sp>
+        <p:nvSpPr>
+          <p:cNvPr id="3" name="Notes Placeholder 2"/>
+          <p:cNvSpPr>
+            <a:spLocks noGrp="1"/>
+          </p:cNvSpPr>
+          <p:nvPr>
+            <p:ph type="body" idx="1"/>
+          </p:nvPr>
+        </p:nvSpPr>
+        <p:spPr/>
+        <p:txBody>
+          <a:bodyPr/>
+          <a:lstStyle/>
+          <a:p>
+            <a:endParaRPr lang="en-US" dirty="0"/>
+          </a:p>
+        </p:txBody>
+      </p:sp>
+      <p:sp>
+        <p:nvSpPr>
+          <p:cNvPr id="4" name="Slide Number Placeholder 3"/>
+          <p:cNvSpPr>
+            <a:spLocks noGrp="1"/>
+          </p:cNvSpPr>
+          <p:nvPr>
+            <p:ph type="sldNum" sz="quarter" idx="5"/>
+          </p:nvPr>
+        </p:nvSpPr>
+        <p:spPr/>
+        <p:txBody>
+          <a:bodyPr/>
+          <a:lstStyle/>
+          <a:p>
+            <a:fld id="{4C6D392E-C4EF-4AC5-9CF0-E17168E17BBE}" type="slidenum">
+              <a:rPr lang="en-US" smtClean="0"/>
+              <a:t>9</a:t>
             </a:fld>
             <a:endParaRPr lang="en-US"/>
           </a:p>
@@ -1218,7 +1303,7 @@
           <a:p>
             <a:fld id="{8C792E63-5F21-4F54-A864-D84D9F273FCA}" type="datetimeFigureOut">
               <a:rPr lang="en-US" smtClean="0"/>
-              <a:t>11/9/2020</a:t>
+              <a:t>11/12/2020</a:t>
             </a:fld>
             <a:endParaRPr lang="en-US"/>
           </a:p>
@@ -1416,7 +1501,7 @@
           <a:p>
             <a:fld id="{8C792E63-5F21-4F54-A864-D84D9F273FCA}" type="datetimeFigureOut">
               <a:rPr lang="en-US" smtClean="0"/>
-              <a:t>11/9/2020</a:t>
+              <a:t>11/12/2020</a:t>
             </a:fld>
             <a:endParaRPr lang="en-US"/>
           </a:p>
@@ -1624,7 +1709,7 @@
           <a:p>
             <a:fld id="{8C792E63-5F21-4F54-A864-D84D9F273FCA}" type="datetimeFigureOut">
               <a:rPr lang="en-US" smtClean="0"/>
-              <a:t>11/9/2020</a:t>
+              <a:t>11/12/2020</a:t>
             </a:fld>
             <a:endParaRPr lang="en-US"/>
           </a:p>
@@ -1822,7 +1907,7 @@
           <a:p>
             <a:fld id="{8C792E63-5F21-4F54-A864-D84D9F273FCA}" type="datetimeFigureOut">
               <a:rPr lang="en-US" smtClean="0"/>
-              <a:t>11/9/2020</a:t>
+              <a:t>11/12/2020</a:t>
             </a:fld>
             <a:endParaRPr lang="en-US"/>
           </a:p>
@@ -2097,7 +2182,7 @@
           <a:p>
             <a:fld id="{8C792E63-5F21-4F54-A864-D84D9F273FCA}" type="datetimeFigureOut">
               <a:rPr lang="en-US" smtClean="0"/>
-              <a:t>11/9/2020</a:t>
+              <a:t>11/12/2020</a:t>
             </a:fld>
             <a:endParaRPr lang="en-US"/>
           </a:p>
@@ -2362,7 +2447,7 @@
           <a:p>
             <a:fld id="{8C792E63-5F21-4F54-A864-D84D9F273FCA}" type="datetimeFigureOut">
               <a:rPr lang="en-US" smtClean="0"/>
-              <a:t>11/9/2020</a:t>
+              <a:t>11/12/2020</a:t>
             </a:fld>
             <a:endParaRPr lang="en-US"/>
           </a:p>
@@ -2774,7 +2859,7 @@
           <a:p>
             <a:fld id="{8C792E63-5F21-4F54-A864-D84D9F273FCA}" type="datetimeFigureOut">
               <a:rPr lang="en-US" smtClean="0"/>
-              <a:t>11/9/2020</a:t>
+              <a:t>11/12/2020</a:t>
             </a:fld>
             <a:endParaRPr lang="en-US"/>
           </a:p>
@@ -2915,7 +3000,7 @@
           <a:p>
             <a:fld id="{8C792E63-5F21-4F54-A864-D84D9F273FCA}" type="datetimeFigureOut">
               <a:rPr lang="en-US" smtClean="0"/>
-              <a:t>11/9/2020</a:t>
+              <a:t>11/12/2020</a:t>
             </a:fld>
             <a:endParaRPr lang="en-US"/>
           </a:p>
@@ -3028,7 +3113,7 @@
           <a:p>
             <a:fld id="{8C792E63-5F21-4F54-A864-D84D9F273FCA}" type="datetimeFigureOut">
               <a:rPr lang="en-US" smtClean="0"/>
-              <a:t>11/9/2020</a:t>
+              <a:t>11/12/2020</a:t>
             </a:fld>
             <a:endParaRPr lang="en-US"/>
           </a:p>
@@ -3339,7 +3424,7 @@
           <a:p>
             <a:fld id="{8C792E63-5F21-4F54-A864-D84D9F273FCA}" type="datetimeFigureOut">
               <a:rPr lang="en-US" smtClean="0"/>
-              <a:t>11/9/2020</a:t>
+              <a:t>11/12/2020</a:t>
             </a:fld>
             <a:endParaRPr lang="en-US"/>
           </a:p>
@@ -3627,7 +3712,7 @@
           <a:p>
             <a:fld id="{8C792E63-5F21-4F54-A864-D84D9F273FCA}" type="datetimeFigureOut">
               <a:rPr lang="en-US" smtClean="0"/>
-              <a:t>11/9/2020</a:t>
+              <a:t>11/12/2020</a:t>
             </a:fld>
             <a:endParaRPr lang="en-US"/>
           </a:p>
@@ -3868,7 +3953,7 @@
           <a:p>
             <a:fld id="{8C792E63-5F21-4F54-A864-D84D9F273FCA}" type="datetimeFigureOut">
               <a:rPr lang="en-US" smtClean="0"/>
-              <a:t>11/9/2020</a:t>
+              <a:t>11/12/2020</a:t>
             </a:fld>
             <a:endParaRPr lang="en-US"/>
           </a:p>
@@ -4504,7 +4589,7 @@
             </a:pPr>
             <a:r>
               <a:rPr lang="en-US" sz="2200" dirty="0"/>
-              <a:t>Use Case 1: limited on-site PKI functionality support, requires relying on a backend PKI, to perform (final) authorization of certification requests for operational certificate (</a:t>
+              <a:t>Use Case 1: (follows the BRSKI PULL model) limited on-site PKI functionality support, requires relying on a backend PKI, to perform (final) authorization of certification requests for operational certificate (</a:t>
             </a:r>
             <a:r>
               <a:rPr lang="en-US" sz="2200" dirty="0" err="1"/>
@@ -4512,7 +4597,7 @@
             </a:r>
             <a:r>
               <a:rPr lang="en-US" sz="2200" dirty="0"/>
-              <a:t>). </a:t>
+              <a:t>). The pledge PULLs all necessary information from the registrar</a:t>
             </a:r>
           </a:p>
           <a:p>
@@ -4529,7 +4614,7 @@
             </a:pPr>
             <a:r>
               <a:rPr lang="en-US" sz="2200" dirty="0"/>
-              <a:t>Use Case 2: reversed client – sever roles in deployment or limited connectivity to a domain registrar</a:t>
+              <a:t>Use Case 2: (introduces PUSH model) reversed client – sever roles in deployment (e.g. limited connectivity to a domain registrar). The pledge(-callee) is triggered to generate or to receive the necessary onboarding information.</a:t>
             </a:r>
           </a:p>
           <a:p>
@@ -4546,7 +4631,7 @@
             </a:pPr>
             <a:r>
               <a:rPr lang="en-US" sz="2200" dirty="0"/>
-              <a:t>Draft addresses these issues by updating BRSKI to support authenticated self-contained objects (signed-wrapped objects) for the certificate enrolment to bind proof of possession and poof of identity to the objects in a similar way as already applied for the voucher handling to be transport independent. </a:t>
+              <a:t>Draft addresses these issues by enhancing BRSKI to support authenticated self-contained objects (signed-wrapped objects) for the certificate enrolment to bind proof of possession and poof of identity to the objects in a similar way as already applied for the pledge voucher handling to be transport independent. </a:t>
             </a:r>
           </a:p>
         </p:txBody>
@@ -4606,7 +4691,14 @@
           <a:p>
             <a:r>
               <a:rPr lang="en-US" sz="3600" dirty="0"/>
-              <a:t>Current focus on use case 2</a:t>
+              <a:t>BRSKI-AE Status</a:t>
+            </a:r>
+            <a:br>
+              <a:rPr lang="en-US" sz="3600" dirty="0"/>
+            </a:br>
+            <a:r>
+              <a:rPr lang="en-US" sz="3600" dirty="0"/>
+              <a:t>Current focus on use case 2 – PUSH model </a:t>
             </a:r>
           </a:p>
         </p:txBody>
@@ -4629,8 +4721,8 @@
         </p:nvSpPr>
         <p:spPr>
           <a:xfrm>
-            <a:off x="682589" y="1493750"/>
-            <a:ext cx="6289711" cy="4587382"/>
+            <a:off x="682589" y="1493749"/>
+            <a:ext cx="6410771" cy="4999125"/>
           </a:xfrm>
         </p:spPr>
         <p:txBody>
@@ -4647,12 +4739,12 @@
                 <a:spcPts val="0"/>
               </a:spcBef>
               <a:spcAft>
-                <a:spcPts val="1000"/>
+                <a:spcPts val="600"/>
               </a:spcAft>
             </a:pPr>
             <a:r>
               <a:rPr lang="en-US" sz="2000" dirty="0"/>
-              <a:t>Develop interaction between pledge, pledge-agent, and domain registrar</a:t>
+              <a:t>Develop PUSH model interaction between pledge(-callee), pledge-agent, and domain registrar</a:t>
             </a:r>
           </a:p>
           <a:p>
@@ -4664,12 +4756,12 @@
                 <a:spcPts val="0"/>
               </a:spcBef>
               <a:spcAft>
-                <a:spcPts val="1000"/>
+                <a:spcPts val="600"/>
               </a:spcAft>
             </a:pPr>
             <a:r>
               <a:rPr lang="en-US" sz="2000" dirty="0"/>
-              <a:t>Protocol approach for the first step close to BRSKI, with the specifics of reversed roles between pledge-agent and pledge:</a:t>
+              <a:t>Protocol approach for the first step close to BRSKI, with the specifics of the PUSH model with reversed roles between pledge(-callee) and pledge-agent:</a:t>
             </a:r>
           </a:p>
           <a:p>
@@ -4681,7 +4773,7 @@
                 <a:spcPts val="0"/>
               </a:spcBef>
               <a:spcAft>
-                <a:spcPts val="1000"/>
+                <a:spcPts val="600"/>
               </a:spcAft>
             </a:pPr>
             <a:r>
@@ -4698,7 +4790,7 @@
                 <a:spcPts val="0"/>
               </a:spcBef>
               <a:spcAft>
-                <a:spcPts val="1000"/>
+                <a:spcPts val="600"/>
               </a:spcAft>
             </a:pPr>
             <a:r>
@@ -4715,7 +4807,7 @@
                 <a:spcPts val="0"/>
               </a:spcBef>
               <a:spcAft>
-                <a:spcPts val="1000"/>
+                <a:spcPts val="600"/>
               </a:spcAft>
             </a:pPr>
             <a:r>
@@ -4732,7 +4824,7 @@
                 <a:spcPts val="0"/>
               </a:spcBef>
               <a:spcAft>
-                <a:spcPts val="1000"/>
+                <a:spcPts val="600"/>
               </a:spcAft>
             </a:pPr>
             <a:r>
@@ -4749,12 +4841,12 @@
                 <a:spcPts val="0"/>
               </a:spcBef>
               <a:spcAft>
-                <a:spcPts val="1000"/>
+                <a:spcPts val="600"/>
               </a:spcAft>
             </a:pPr>
             <a:r>
               <a:rPr lang="en-US" sz="2000" dirty="0"/>
-              <a:t>Endpoints for the pledge</a:t>
+              <a:t>Endpoint definition for the pledge(-callee) modeled similar to BRSKI exchanges</a:t>
             </a:r>
           </a:p>
           <a:p>
@@ -4766,12 +4858,12 @@
                 <a:spcPts val="0"/>
               </a:spcBef>
               <a:spcAft>
-                <a:spcPts val="1000"/>
+                <a:spcPts val="600"/>
               </a:spcAft>
             </a:pPr>
             <a:r>
               <a:rPr lang="en-US" sz="2000" dirty="0"/>
-              <a:t>Object format for exchange of signature wrapped objects</a:t>
+              <a:t>Object format for exchange of signature wrapped objects (pledge voucher and certification request)</a:t>
             </a:r>
           </a:p>
         </p:txBody>
@@ -4792,8 +4884,8 @@
         </p:nvSpPr>
         <p:spPr>
           <a:xfrm>
-            <a:off x="7093360" y="1719226"/>
-            <a:ext cx="4965290" cy="4136431"/>
+            <a:off x="7093360" y="1668830"/>
+            <a:ext cx="4965290" cy="4462499"/>
           </a:xfrm>
           <a:prstGeom prst="rect">
             <a:avLst/>
@@ -5256,7 +5348,7 @@
                 <a:ea typeface="Calibri" panose="020F0502020204030204" pitchFamily="34" charset="0"/>
                 <a:cs typeface="Courier New" panose="02070309020205020404" pitchFamily="49" charset="0"/>
               </a:rPr>
-              <a:t>+-------+     +-------+     .............................|.........</a:t>
+              <a:t>+--------+     +-------+     .............................|.........</a:t>
             </a:r>
           </a:p>
           <a:p>
@@ -5275,7 +5367,7 @@
                 <a:ea typeface="Calibri" panose="020F0502020204030204" pitchFamily="34" charset="0"/>
                 <a:cs typeface="Courier New" panose="02070309020205020404" pitchFamily="49" charset="0"/>
               </a:rPr>
-              <a:t>|       |     |       |     .                            |        .</a:t>
+              <a:t>|        |     |       |     .                            |        .</a:t>
             </a:r>
           </a:p>
           <a:p>
@@ -5294,7 +5386,7 @@
                 <a:ea typeface="Calibri" panose="020F0502020204030204" pitchFamily="34" charset="0"/>
                 <a:cs typeface="Courier New" panose="02070309020205020404" pitchFamily="49" charset="0"/>
               </a:rPr>
-              <a:t>|       |     |       |     .  +-----------+       +-----v-----+  .</a:t>
+              <a:t>|        |     |       |     .  +-----------+       +-----v-----+  .</a:t>
             </a:r>
           </a:p>
           <a:p>
@@ -5313,7 +5405,7 @@
                 <a:ea typeface="Calibri" panose="020F0502020204030204" pitchFamily="34" charset="0"/>
                 <a:cs typeface="Courier New" panose="02070309020205020404" pitchFamily="49" charset="0"/>
               </a:rPr>
-              <a:t>|       |     |Pledge |     .  |           |       |           |  .</a:t>
+              <a:t>|        |     |Pledge |     .  |           |       |           |  .</a:t>
             </a:r>
           </a:p>
           <a:p>
@@ -5332,7 +5424,7 @@
                 <a:ea typeface="Calibri" panose="020F0502020204030204" pitchFamily="34" charset="0"/>
                 <a:cs typeface="Courier New" panose="02070309020205020404" pitchFamily="49" charset="0"/>
               </a:rPr>
-              <a:t>|Pledge |     | Agent |     .  |   Join    |       | Domain    |  .  </a:t>
+              <a:t>|Pledge(-|     | Agent |     .  |   Join    |       | Domain    |  .  </a:t>
             </a:r>
           </a:p>
           <a:p>
@@ -5351,7 +5443,7 @@
                 <a:ea typeface="Calibri" panose="020F0502020204030204" pitchFamily="34" charset="0"/>
                 <a:cs typeface="Courier New" panose="02070309020205020404" pitchFamily="49" charset="0"/>
               </a:rPr>
-              <a:t>|       |     |       |     .  |   Proxy   |       | Registrar |  .</a:t>
+              <a:t>|callee) |     |       |     .  |   Proxy   |       | Registrar |  .</a:t>
             </a:r>
           </a:p>
           <a:p>
@@ -5370,7 +5462,7 @@
                 <a:ea typeface="Calibri" panose="020F0502020204030204" pitchFamily="34" charset="0"/>
                 <a:cs typeface="Courier New" panose="02070309020205020404" pitchFamily="49" charset="0"/>
               </a:rPr>
-              <a:t>|       &lt;-----&gt;.......&lt;--------&gt;...........&lt;-------&gt; (PKI RA)  |  .</a:t>
+              <a:t>|        &lt;-----&gt;.......&lt;--------&gt;...........&lt;-------&gt; (PKI RA)  |  .</a:t>
             </a:r>
           </a:p>
           <a:p>
@@ -5389,7 +5481,7 @@
                 <a:ea typeface="Calibri" panose="020F0502020204030204" pitchFamily="34" charset="0"/>
                 <a:cs typeface="Courier New" panose="02070309020205020404" pitchFamily="49" charset="0"/>
               </a:rPr>
-              <a:t>|       |     |       |     .  |       BRSKI-AE    |           |  .</a:t>
+              <a:t>|    BRSKI-AE/PUSH     |BRSKI-AE|          BRSKI-AE |           |  .</a:t>
             </a:r>
           </a:p>
           <a:p>
@@ -5408,7 +5500,7 @@
                 <a:ea typeface="Calibri" panose="020F0502020204030204" pitchFamily="34" charset="0"/>
                 <a:cs typeface="Courier New" panose="02070309020205020404" pitchFamily="49" charset="0"/>
               </a:rPr>
-              <a:t>|       |     |       |     .  |           |       +-----+-----+  .</a:t>
+              <a:t>|        |     |       |     .  |           |       +-----+-----+  .</a:t>
             </a:r>
           </a:p>
           <a:p>
@@ -5443,7 +5535,7 @@
                 <a:ea typeface="Calibri" panose="020F0502020204030204" pitchFamily="34" charset="0"/>
                 <a:cs typeface="Courier New" panose="02070309020205020404" pitchFamily="49" charset="0"/>
               </a:rPr>
-              <a:t> |     |opt.   |     .  +-----------+         e.g. RFC7030 .</a:t>
+              <a:t>  |     |opt.   |     .  +-----------+         e.g. RFC7030 .</a:t>
             </a:r>
           </a:p>
           <a:p>
@@ -5462,7 +5554,7 @@
                 <a:ea typeface="Calibri" panose="020F0502020204030204" pitchFamily="34" charset="0"/>
                 <a:cs typeface="Courier New" panose="02070309020205020404" pitchFamily="49" charset="0"/>
               </a:rPr>
-              <a:t>|       |     |</a:t>
+              <a:t>|        |     |</a:t>
             </a:r>
             <a:r>
               <a:rPr lang="en-US" sz="900" dirty="0" err="1">
@@ -5497,7 +5589,7 @@
                 <a:ea typeface="Calibri" panose="020F0502020204030204" pitchFamily="34" charset="0"/>
                 <a:cs typeface="Courier New" panose="02070309020205020404" pitchFamily="49" charset="0"/>
               </a:rPr>
-              <a:t>|       |     |or     |     .         | Key Infrastructure     |  .</a:t>
+              <a:t>|        |     |or     |     .         | Key Infrastructure     |  .</a:t>
             </a:r>
           </a:p>
           <a:p>
@@ -5516,7 +5608,7 @@
                 <a:ea typeface="Calibri" panose="020F0502020204030204" pitchFamily="34" charset="0"/>
                 <a:cs typeface="Courier New" panose="02070309020205020404" pitchFamily="49" charset="0"/>
               </a:rPr>
-              <a:t>|       |     |</a:t>
+              <a:t>|        |     |</a:t>
             </a:r>
             <a:r>
               <a:rPr lang="en-US" sz="900" dirty="0" err="1">
@@ -5551,7 +5643,7 @@
                 <a:ea typeface="Calibri" panose="020F0502020204030204" pitchFamily="34" charset="0"/>
                 <a:cs typeface="Courier New" panose="02070309020205020404" pitchFamily="49" charset="0"/>
               </a:rPr>
-              <a:t>+-------+     +-------+     .         |       Authority)       |  .</a:t>
+              <a:t>+--------+     +-------+     .         |       Authority)       |  .</a:t>
             </a:r>
           </a:p>
           <a:p>
@@ -5570,7 +5662,7 @@
                 <a:ea typeface="Calibri" panose="020F0502020204030204" pitchFamily="34" charset="0"/>
                 <a:cs typeface="Courier New" panose="02070309020205020404" pitchFamily="49" charset="0"/>
               </a:rPr>
-              <a:t>                            .         +------------------------+  .</a:t>
+              <a:t>                             .         +------------------------+  .</a:t>
             </a:r>
           </a:p>
           <a:p>
@@ -5589,7 +5681,7 @@
                 <a:ea typeface="Calibri" panose="020F0502020204030204" pitchFamily="34" charset="0"/>
                 <a:cs typeface="Courier New" panose="02070309020205020404" pitchFamily="49" charset="0"/>
               </a:rPr>
-              <a:t>                            .......................................</a:t>
+              <a:t>                             .......................................</a:t>
             </a:r>
           </a:p>
           <a:p>
@@ -5608,12 +5700,41 @@
                 <a:ea typeface="Calibri" panose="020F0502020204030204" pitchFamily="34" charset="0"/>
                 <a:cs typeface="Courier New" panose="02070309020205020404" pitchFamily="49" charset="0"/>
               </a:rPr>
-              <a:t>                                      "Domain" components</a:t>
-            </a:r>
+              <a:t>                                       "Domain" components</a:t>
+            </a:r>
+          </a:p>
+          <a:p>
+            <a:pPr marL="0" indent="0">
+              <a:lnSpc>
+                <a:spcPct val="100000"/>
+              </a:lnSpc>
+              <a:spcBef>
+                <a:spcPts val="0"/>
+              </a:spcBef>
+              <a:buNone/>
+            </a:pPr>
             <a:endParaRPr lang="en-US" sz="900" dirty="0">
               <a:latin typeface="Courier New" panose="02070309020205020404" pitchFamily="49" charset="0"/>
               <a:cs typeface="Courier New" panose="02070309020205020404" pitchFamily="49" charset="0"/>
             </a:endParaRPr>
+          </a:p>
+          <a:p>
+            <a:pPr marL="0" indent="0">
+              <a:lnSpc>
+                <a:spcPct val="100000"/>
+              </a:lnSpc>
+              <a:spcBef>
+                <a:spcPts val="0"/>
+              </a:spcBef>
+              <a:buNone/>
+            </a:pPr>
+            <a:r>
+              <a:rPr lang="en-US" sz="900" dirty="0">
+                <a:latin typeface="Courier New" panose="02070309020205020404" pitchFamily="49" charset="0"/>
+                <a:cs typeface="Courier New" panose="02070309020205020404" pitchFamily="49" charset="0"/>
+              </a:rPr>
+              <a:t>Note: Join Proxy may be optional, depending on pledge-agent configuration or registrar discovery </a:t>
+            </a:r>
           </a:p>
         </p:txBody>
       </p:sp>
@@ -5663,12 +5784,7 @@
             <p:ph type="title"/>
           </p:nvPr>
         </p:nvSpPr>
-        <p:spPr>
-          <a:xfrm>
-            <a:off x="838200" y="365125"/>
-            <a:ext cx="10516235" cy="1326515"/>
-          </a:xfrm>
-        </p:spPr>
+        <p:spPr/>
         <p:txBody>
           <a:bodyPr>
             <a:normAutofit/>
@@ -5676,12 +5792,9 @@
           <a:lstStyle/>
           <a:p>
             <a:r>
-              <a:rPr lang="en-US" sz="3600" dirty="0">
-                <a:sym typeface="Wingdings" panose="05000000000000000000" pitchFamily="2" charset="2"/>
-              </a:rPr>
-              <a:t>BRSKI design team discussions focus on Use case 2: Trust relations</a:t>
-            </a:r>
-            <a:endParaRPr lang="en-US" sz="3600" dirty="0"/>
+              <a:rPr lang="en-US" sz="3600" dirty="0"/>
+              <a:t>Backup (more details)</a:t>
+            </a:r>
           </a:p>
         </p:txBody>
       </p:sp>
@@ -5703,12 +5816,12 @@
         </p:nvSpPr>
         <p:spPr>
           <a:xfrm>
-            <a:off x="701675" y="1850223"/>
-            <a:ext cx="10669905" cy="4436277"/>
+            <a:off x="701640" y="1727148"/>
+            <a:ext cx="10515600" cy="4594993"/>
           </a:xfrm>
         </p:spPr>
         <p:txBody>
-          <a:bodyPr vert="horz" wrap="square" lIns="91440" tIns="45720" rIns="91440" bIns="45720" numCol="1" anchor="t">
+          <a:bodyPr>
             <a:noAutofit/>
           </a:bodyPr>
           <a:lstStyle/>
@@ -5717,172 +5830,15 @@
               <a:lnSpc>
                 <a:spcPct val="100000"/>
               </a:lnSpc>
-              <a:spcBef>
-                <a:spcPts val="0"/>
-              </a:spcBef>
-              <a:spcAft>
-                <a:spcPts val="1000"/>
-              </a:spcAft>
-              <a:buClr>
-                <a:srgbClr val="000000"/>
-              </a:buClr>
-              <a:buFont typeface="Arial"/>
-              <a:buChar char="•"/>
             </a:pPr>
-            <a:r>
-              <a:rPr lang="en-US" altLang="ko-KR" sz="2000" dirty="0">
-                <a:latin typeface="Calibri" charset="0"/>
-                <a:ea typeface="Calibri" charset="0"/>
-              </a:rPr>
-              <a:t>Clarification of trust relation between pledge-agent and pledge and pledge-agent and domain registrar. Ideal: less trust assumptions on pledge-agent.</a:t>
-            </a:r>
-          </a:p>
-          <a:p>
-            <a:pPr>
-              <a:lnSpc>
-                <a:spcPct val="100000"/>
-              </a:lnSpc>
-              <a:spcBef>
-                <a:spcPts val="0"/>
-              </a:spcBef>
-              <a:spcAft>
-                <a:spcPts val="1000"/>
-              </a:spcAft>
-              <a:buClr>
-                <a:srgbClr val="000000"/>
-              </a:buClr>
-              <a:buFont typeface="Arial"/>
-              <a:buChar char="•"/>
-            </a:pPr>
-            <a:r>
-              <a:rPr lang="en-US" altLang="ko-KR" sz="2000" dirty="0">
-                <a:latin typeface="Calibri" charset="0"/>
-                <a:ea typeface="Calibri" charset="0"/>
-              </a:rPr>
-              <a:t>Options</a:t>
-            </a:r>
-          </a:p>
-          <a:p>
-            <a:pPr lvl="1">
-              <a:lnSpc>
-                <a:spcPct val="100000"/>
-              </a:lnSpc>
-              <a:spcBef>
-                <a:spcPts val="0"/>
-              </a:spcBef>
-              <a:spcAft>
-                <a:spcPts val="1000"/>
-              </a:spcAft>
-              <a:buClr>
-                <a:srgbClr val="000000"/>
-              </a:buClr>
-              <a:buFont typeface="Arial"/>
-              <a:buChar char="•"/>
-            </a:pPr>
-            <a:r>
-              <a:rPr lang="en-US" altLang="ko-KR" sz="2000" dirty="0">
-                <a:latin typeface="Calibri" charset="0"/>
-                <a:ea typeface="Calibri" charset="0"/>
-              </a:rPr>
-              <a:t>Pledge-agent / pledge: Potential use of a QR code or similar to show proximity between pledge and pledge-agent. Can be used for instance in a TLS cipher suite utilizing the QR code. </a:t>
-            </a:r>
-            <a:br>
-              <a:rPr lang="en-US" altLang="ko-KR" sz="2000" dirty="0">
-                <a:latin typeface="Calibri" charset="0"/>
-                <a:ea typeface="Calibri" charset="0"/>
-              </a:rPr>
-            </a:br>
-            <a:r>
-              <a:rPr lang="en-US" altLang="ko-KR" sz="2000" dirty="0">
-                <a:latin typeface="Calibri" charset="0"/>
-                <a:ea typeface="Calibri" charset="0"/>
-              </a:rPr>
-              <a:t>Use of </a:t>
-            </a:r>
-            <a:r>
-              <a:rPr lang="en-US" altLang="ko-KR" sz="2000" dirty="0" err="1">
-                <a:latin typeface="Calibri" charset="0"/>
-                <a:ea typeface="Calibri" charset="0"/>
-              </a:rPr>
-              <a:t>subcerts</a:t>
-            </a:r>
-            <a:r>
-              <a:rPr lang="en-US" altLang="ko-KR" sz="2000" dirty="0">
-                <a:latin typeface="Calibri" charset="0"/>
-                <a:ea typeface="Calibri" charset="0"/>
-              </a:rPr>
-              <a:t> draft has been discussed, but neglected, as other use cases may not consider a TLS connection here and benefit a close binding (e.g., when using BT or NFC or other)</a:t>
-            </a:r>
-          </a:p>
-          <a:p>
-            <a:pPr lvl="1">
-              <a:lnSpc>
-                <a:spcPct val="100000"/>
-              </a:lnSpc>
-              <a:spcBef>
-                <a:spcPts val="0"/>
-              </a:spcBef>
-              <a:spcAft>
-                <a:spcPts val="1000"/>
-              </a:spcAft>
-              <a:buClr>
-                <a:srgbClr val="000000"/>
-              </a:buClr>
-              <a:buFont typeface="Arial"/>
-              <a:buChar char="•"/>
-            </a:pPr>
-            <a:r>
-              <a:rPr lang="en-US" altLang="ko-KR" sz="2000" dirty="0">
-                <a:latin typeface="Calibri" charset="0"/>
-                <a:ea typeface="Calibri" charset="0"/>
-              </a:rPr>
-              <a:t>Pledge-agent / registrar: Potential use of server side only TLS and HTTP authentication from the pledge-agent (e.g. allowing a service technician to authenticate) as alternative to </a:t>
-            </a:r>
-            <a:r>
-              <a:rPr lang="en-US" altLang="ko-KR" sz="2000" dirty="0" err="1">
-                <a:latin typeface="Calibri" charset="0"/>
-                <a:ea typeface="Calibri" charset="0"/>
-              </a:rPr>
-              <a:t>LDevID</a:t>
-            </a:r>
-            <a:r>
-              <a:rPr lang="en-US" altLang="ko-KR" sz="2000" dirty="0">
-                <a:latin typeface="Calibri" charset="0"/>
-                <a:ea typeface="Calibri" charset="0"/>
-              </a:rPr>
-              <a:t> on pledge-agent (both already stated in the 00 draft for use case 2) </a:t>
-            </a:r>
-          </a:p>
-          <a:p>
-            <a:pPr>
-              <a:lnSpc>
-                <a:spcPct val="100000"/>
-              </a:lnSpc>
-              <a:spcBef>
-                <a:spcPts val="0"/>
-              </a:spcBef>
-              <a:spcAft>
-                <a:spcPts val="1000"/>
-              </a:spcAft>
-              <a:buClr>
-                <a:srgbClr val="000000"/>
-              </a:buClr>
-              <a:buFont typeface="Arial"/>
-              <a:buChar char="•"/>
-            </a:pPr>
-            <a:r>
-              <a:rPr lang="en-US" altLang="ko-KR" sz="2000" dirty="0">
-                <a:latin typeface="Calibri" charset="0"/>
-              </a:rPr>
-              <a:t>Ongoing discussion about potential attack and misuse cases when relying on signature wrapped object exchange between pledge and domain registrar</a:t>
-            </a:r>
+            <a:endParaRPr lang="en-US" sz="2200" dirty="0"/>
           </a:p>
         </p:txBody>
       </p:sp>
     </p:spTree>
     <p:extLst>
       <p:ext uri="{BB962C8B-B14F-4D97-AF65-F5344CB8AC3E}">
-        <p14:creationId xmlns:p14="http://schemas.microsoft.com/office/powerpoint/2010/main" val="713471908"/>
+        <p14:creationId xmlns:p14="http://schemas.microsoft.com/office/powerpoint/2010/main" val="3049847218"/>
       </p:ext>
     </p:extLst>
   </p:cSld>
@@ -5941,7 +5897,7 @@
               <a:rPr lang="en-US" sz="3600" dirty="0">
                 <a:sym typeface="Wingdings" panose="05000000000000000000" pitchFamily="2" charset="2"/>
               </a:rPr>
-              <a:t>Further discussions on use case 2: </a:t>
+              <a:t>BRSKI design team discussions focus on use case 2: </a:t>
             </a:r>
             <a:br>
               <a:rPr lang="en-US" sz="3600" dirty="0">
@@ -5952,7 +5908,7 @@
               <a:rPr lang="en-US" sz="3600" dirty="0">
                 <a:sym typeface="Wingdings" panose="05000000000000000000" pitchFamily="2" charset="2"/>
               </a:rPr>
-              <a:t>Pledge-endpoints</a:t>
+              <a:t>Trust relations</a:t>
             </a:r>
             <a:endParaRPr lang="en-US" sz="3600" dirty="0"/>
           </a:p>
@@ -5976,8 +5932,8 @@
         </p:nvSpPr>
         <p:spPr>
           <a:xfrm>
-            <a:off x="701675" y="1850223"/>
-            <a:ext cx="10669905" cy="4642652"/>
+            <a:off x="701675" y="1713063"/>
+            <a:ext cx="10669905" cy="4897287"/>
           </a:xfrm>
         </p:spPr>
         <p:txBody>
@@ -6003,11 +5959,11 @@
               <a:buChar char="•"/>
             </a:pPr>
             <a:r>
-              <a:rPr lang="en-US" altLang="ko-KR" sz="2200" dirty="0">
+              <a:rPr lang="en-US" altLang="ko-KR" sz="2000" dirty="0">
                 <a:latin typeface="Calibri" charset="0"/>
                 <a:ea typeface="Calibri" charset="0"/>
               </a:rPr>
-              <a:t>Endpoints on the pledge are currently discussed allowing a pledge agent to trigger voucher request generation and certification request generation.</a:t>
+              <a:t>Clarification of trust relation between pledge-agent and pledge and pledge-agent and domain registrar. Ideal: less trust assumptions on pledge-agent (could be ideally on a mobile device and only temporary available).</a:t>
             </a:r>
           </a:p>
           <a:p>
@@ -6028,11 +5984,11 @@
               <a:buChar char="•"/>
             </a:pPr>
             <a:r>
-              <a:rPr lang="en-US" altLang="ko-KR" sz="2200" dirty="0">
+              <a:rPr lang="en-US" altLang="ko-KR" sz="2000" dirty="0">
                 <a:latin typeface="Calibri" charset="0"/>
                 <a:ea typeface="Calibri" charset="0"/>
               </a:rPr>
-              <a:t>Demand seen for at least four endpoints: </a:t>
+              <a:t>Options</a:t>
             </a:r>
           </a:p>
           <a:p>
@@ -6053,22 +6009,51 @@
               <a:buChar char="•"/>
             </a:pPr>
             <a:r>
-              <a:rPr lang="en-US" altLang="ko-KR" sz="2200" dirty="0">
+              <a:rPr lang="en-US" altLang="ko-KR" sz="2000" dirty="0">
                 <a:latin typeface="Calibri" charset="0"/>
-              </a:rPr>
-              <a:t>/</a:t>
-            </a:r>
-            <a:r>
-              <a:rPr lang="en-US" altLang="ko-KR" sz="2200" dirty="0" err="1">
+                <a:ea typeface="Calibri" charset="0"/>
+              </a:rPr>
+              <a:t>Pledge-agent / pledge(-callee): Potential use of a QR code or similar to show proximity between pledge(-callee) and pledge-agent. Can be used for instance in a TLS cipher suite. </a:t>
+            </a:r>
+            <a:br>
+              <a:rPr lang="en-US" altLang="ko-KR" sz="2000" dirty="0">
                 <a:latin typeface="Calibri" charset="0"/>
-              </a:rPr>
-              <a:t>triggervoucherrequest</a:t>
-            </a:r>
-            <a:r>
-              <a:rPr lang="en-US" altLang="ko-KR" sz="2200" dirty="0">
+                <a:ea typeface="Calibri" charset="0"/>
+              </a:rPr>
+            </a:br>
+            <a:r>
+              <a:rPr lang="en-US" altLang="ko-KR" sz="2000" dirty="0">
                 <a:latin typeface="Calibri" charset="0"/>
-              </a:rPr>
-              <a:t>: initiates request creation on pledge, returns voucher request  </a:t>
+                <a:ea typeface="Calibri" charset="0"/>
+              </a:rPr>
+              <a:t>Use of </a:t>
+            </a:r>
+            <a:r>
+              <a:rPr lang="en-US" altLang="ko-KR" sz="2000" dirty="0" err="1">
+                <a:latin typeface="Calibri" charset="0"/>
+                <a:ea typeface="Calibri" charset="0"/>
+              </a:rPr>
+              <a:t>subcerts</a:t>
+            </a:r>
+            <a:r>
+              <a:rPr lang="en-US" altLang="ko-KR" sz="2000" dirty="0">
+                <a:latin typeface="Calibri" charset="0"/>
+                <a:ea typeface="Calibri" charset="0"/>
+              </a:rPr>
+              <a:t> draft has been discussed, but neglected, as other use cases may not feature </a:t>
+            </a:r>
+            <a:br>
+              <a:rPr lang="en-US" altLang="ko-KR" sz="2000" dirty="0">
+                <a:latin typeface="Calibri" charset="0"/>
+                <a:ea typeface="Calibri" charset="0"/>
+              </a:rPr>
+            </a:br>
+            <a:r>
+              <a:rPr lang="en-US" altLang="ko-KR" sz="2000" dirty="0">
+                <a:latin typeface="Calibri" charset="0"/>
+                <a:ea typeface="Calibri" charset="0"/>
+              </a:rPr>
+              <a:t>a TLS connection here and benefit a close protocol binding (e.g., BT or NFC or other)</a:t>
             </a:r>
           </a:p>
           <a:p>
@@ -6089,26 +6074,29 @@
               <a:buChar char="•"/>
             </a:pPr>
             <a:r>
-              <a:rPr lang="en-US" altLang="ko-KR" sz="2200" dirty="0">
+              <a:rPr lang="en-US" altLang="ko-KR" sz="2000" dirty="0">
                 <a:latin typeface="Calibri" charset="0"/>
-              </a:rPr>
-              <a:t>/</a:t>
-            </a:r>
-            <a:r>
-              <a:rPr lang="en-US" altLang="ko-KR" sz="2200" dirty="0" err="1">
+                <a:ea typeface="Calibri" charset="0"/>
+              </a:rPr>
+              <a:t>Pledge-agent / registrar: Potential use of server side only TLS and HTTP authentication from the pledge-agent (e.g. allowing a service technician to authenticate) as alternative to </a:t>
+            </a:r>
+            <a:r>
+              <a:rPr lang="en-US" altLang="ko-KR" sz="2000" dirty="0" err="1">
                 <a:latin typeface="Calibri" charset="0"/>
-              </a:rPr>
-              <a:t>triggercertrequest</a:t>
-            </a:r>
-            <a:r>
-              <a:rPr lang="en-US" altLang="ko-KR" sz="2200" dirty="0">
+                <a:ea typeface="Calibri" charset="0"/>
+              </a:rPr>
+              <a:t>LDevID</a:t>
+            </a:r>
+            <a:r>
+              <a:rPr lang="en-US" altLang="ko-KR" sz="2000" dirty="0">
                 <a:latin typeface="Calibri" charset="0"/>
-              </a:rPr>
-              <a:t>: initiates request creation on pledge, returns certification request    </a:t>
-            </a:r>
-          </a:p>
-          <a:p>
-            <a:pPr lvl="1">
+                <a:ea typeface="Calibri" charset="0"/>
+              </a:rPr>
+              <a:t> on pledge-agent (both already stated in the 00 draft for use case 2) </a:t>
+            </a:r>
+          </a:p>
+          <a:p>
+            <a:pPr>
               <a:lnSpc>
                 <a:spcPct val="100000"/>
               </a:lnSpc>
@@ -6125,162 +6113,18 @@
               <a:buChar char="•"/>
             </a:pPr>
             <a:r>
-              <a:rPr lang="en-US" altLang="ko-KR" sz="2200" dirty="0">
-                <a:latin typeface="Calibri" charset="0"/>
-              </a:rPr>
-              <a:t>/</a:t>
-            </a:r>
-            <a:r>
-              <a:rPr lang="en-US" altLang="ko-KR" sz="2200" dirty="0" err="1">
-                <a:latin typeface="Calibri" charset="0"/>
-              </a:rPr>
-              <a:t>supplyvoucher</a:t>
-            </a:r>
-            <a:r>
-              <a:rPr lang="en-US" altLang="ko-KR" sz="2200" dirty="0">
-                <a:latin typeface="Calibri" charset="0"/>
-              </a:rPr>
-              <a:t>: provide voucher to pledge, returns voucher status         </a:t>
-            </a:r>
-          </a:p>
-          <a:p>
-            <a:pPr lvl="1">
-              <a:lnSpc>
-                <a:spcPct val="100000"/>
-              </a:lnSpc>
-              <a:spcBef>
-                <a:spcPts val="0"/>
-              </a:spcBef>
-              <a:spcAft>
-                <a:spcPts val="1000"/>
-              </a:spcAft>
-              <a:buClr>
-                <a:srgbClr val="000000"/>
-              </a:buClr>
-              <a:buFont typeface="Arial"/>
-              <a:buChar char="•"/>
-            </a:pPr>
-            <a:r>
-              <a:rPr lang="en-US" altLang="ko-KR" sz="2200" dirty="0">
-                <a:latin typeface="Calibri" charset="0"/>
-              </a:rPr>
-              <a:t>/</a:t>
-            </a:r>
-            <a:r>
-              <a:rPr lang="en-US" altLang="ko-KR" sz="2200" dirty="0" err="1">
-                <a:latin typeface="Calibri" charset="0"/>
-              </a:rPr>
-              <a:t>supplycertificate</a:t>
-            </a:r>
-            <a:r>
-              <a:rPr lang="en-US" altLang="ko-KR" sz="2200" dirty="0">
-                <a:latin typeface="Calibri" charset="0"/>
-              </a:rPr>
-              <a:t>: provide certificate (and </a:t>
-            </a:r>
-            <a:r>
-              <a:rPr lang="en-US" altLang="ko-KR" sz="2200" dirty="0" err="1">
-                <a:latin typeface="Calibri" charset="0"/>
-              </a:rPr>
-              <a:t>cain</a:t>
-            </a:r>
-            <a:r>
-              <a:rPr lang="en-US" altLang="ko-KR" sz="2200" dirty="0">
-                <a:latin typeface="Calibri" charset="0"/>
-              </a:rPr>
-              <a:t>) to pledge, returns certificate confirmation      </a:t>
-            </a:r>
-          </a:p>
-          <a:p>
-            <a:pPr>
-              <a:lnSpc>
-                <a:spcPct val="100000"/>
-              </a:lnSpc>
-              <a:spcBef>
-                <a:spcPts val="0"/>
-              </a:spcBef>
-              <a:spcAft>
-                <a:spcPts val="1000"/>
-              </a:spcAft>
-              <a:buClr>
-                <a:srgbClr val="000000"/>
-              </a:buClr>
-              <a:buFont typeface="Arial"/>
-              <a:buChar char="•"/>
-            </a:pPr>
-            <a:r>
-              <a:rPr lang="en-US" altLang="ko-KR" sz="2200" dirty="0">
-                <a:latin typeface="Calibri" charset="0"/>
-                <a:ea typeface="Calibri" charset="0"/>
-              </a:rPr>
-              <a:t>Clarification has to start regarding supported encodings of the objects exchanged:</a:t>
-            </a:r>
-          </a:p>
-          <a:p>
-            <a:pPr lvl="1">
-              <a:lnSpc>
-                <a:spcPct val="100000"/>
-              </a:lnSpc>
-              <a:spcBef>
-                <a:spcPts val="0"/>
-              </a:spcBef>
-              <a:spcAft>
-                <a:spcPts val="1000"/>
-              </a:spcAft>
-              <a:buClr>
-                <a:srgbClr val="000000"/>
-              </a:buClr>
-              <a:buFont typeface="Arial"/>
-              <a:buChar char="•"/>
-            </a:pPr>
-            <a:r>
               <a:rPr lang="en-US" altLang="ko-KR" sz="2000" dirty="0">
                 <a:latin typeface="Calibri" charset="0"/>
-                <a:ea typeface="Calibri" charset="0"/>
-              </a:rPr>
-              <a:t>Current voucher object is CMC-signed-JSON. Discussion on relying on </a:t>
-            </a:r>
-            <a:r>
-              <a:rPr lang="en-US" altLang="ko-KR" sz="2000" dirty="0">
-                <a:latin typeface="Calibri" charset="0"/>
-                <a:ea typeface="Calibri" charset="0"/>
-                <a:sym typeface="Wingdings" panose="05000000000000000000" pitchFamily="2" charset="2"/>
-              </a:rPr>
-              <a:t>JWS-signed-JSON in the first step, would also align with using similar formats for the certification request.</a:t>
-            </a:r>
-            <a:endParaRPr lang="en-US" altLang="ko-KR" sz="2000" dirty="0">
-              <a:latin typeface="Calibri" charset="0"/>
-              <a:ea typeface="Calibri" charset="0"/>
-            </a:endParaRPr>
-          </a:p>
-          <a:p>
-            <a:pPr>
-              <a:lnSpc>
-                <a:spcPct val="100000"/>
-              </a:lnSpc>
-              <a:spcBef>
-                <a:spcPts val="0"/>
-              </a:spcBef>
-              <a:spcAft>
-                <a:spcPts val="1000"/>
-              </a:spcAft>
-              <a:buClr>
-                <a:srgbClr val="000000"/>
-              </a:buClr>
-              <a:buFont typeface="Arial"/>
-              <a:buChar char="•"/>
-            </a:pPr>
-            <a:endParaRPr lang="en-US" altLang="ko-KR" sz="2200" dirty="0">
-              <a:latin typeface="Calibri" charset="0"/>
-              <a:ea typeface="Calibri" charset="0"/>
-            </a:endParaRPr>
+              </a:rPr>
+              <a:t>Ongoing discussion about potential attack and misuse cases when relying on signature wrapped object exchange between pledge(-callee) and domain registrar</a:t>
+            </a:r>
           </a:p>
         </p:txBody>
       </p:sp>
     </p:spTree>
     <p:extLst>
       <p:ext uri="{BB962C8B-B14F-4D97-AF65-F5344CB8AC3E}">
-        <p14:creationId xmlns:p14="http://schemas.microsoft.com/office/powerpoint/2010/main" val="1200939753"/>
+        <p14:creationId xmlns:p14="http://schemas.microsoft.com/office/powerpoint/2010/main" val="713471908"/>
       </p:ext>
     </p:extLst>
   </p:cSld>
@@ -6336,14 +6180,21 @@
           <a:lstStyle/>
           <a:p>
             <a:r>
-              <a:rPr lang="en-US" sz="3600" dirty="0"/>
-              <a:t>Changes to </a:t>
-            </a:r>
-            <a:r>
               <a:rPr lang="en-US" sz="3600" dirty="0">
                 <a:sym typeface="Wingdings" panose="05000000000000000000" pitchFamily="2" charset="2"/>
               </a:rPr>
-              <a:t>IETF draft 00 (not submitted yet)</a:t>
+              <a:t>Further discussions on use case 2: </a:t>
+            </a:r>
+            <a:br>
+              <a:rPr lang="en-US" sz="3600" dirty="0">
+                <a:sym typeface="Wingdings" panose="05000000000000000000" pitchFamily="2" charset="2"/>
+              </a:rPr>
+            </a:br>
+            <a:r>
+              <a:rPr lang="en-US" sz="3600" dirty="0">
+                <a:sym typeface="Wingdings" panose="05000000000000000000" pitchFamily="2" charset="2"/>
+              </a:rPr>
+              <a:t>Pledge-endpoints</a:t>
             </a:r>
             <a:endParaRPr lang="en-US" sz="3600" dirty="0"/>
           </a:p>
@@ -6367,8 +6218,8 @@
         </p:nvSpPr>
         <p:spPr>
           <a:xfrm>
-            <a:off x="701675" y="1953739"/>
-            <a:ext cx="10669905" cy="4032993"/>
+            <a:off x="546009" y="1691640"/>
+            <a:ext cx="11376025" cy="4950700"/>
           </a:xfrm>
         </p:spPr>
         <p:txBody>
@@ -6385,7 +6236,7 @@
                 <a:spcPts val="0"/>
               </a:spcBef>
               <a:spcAft>
-                <a:spcPts val="1000"/>
+                <a:spcPts val="600"/>
               </a:spcAft>
               <a:buClr>
                 <a:srgbClr val="000000"/>
@@ -6394,10 +6245,11 @@
               <a:buChar char="•"/>
             </a:pPr>
             <a:r>
-              <a:rPr lang="en-US" altLang="ko-KR" sz="2200" dirty="0">
+              <a:rPr lang="en-US" altLang="ko-KR" sz="2000" dirty="0">
                 <a:latin typeface="Calibri" charset="0"/>
-              </a:rPr>
-              <a:t>Update of scope in Section 3.1 to include that specifically in the pledge acts as a server in use case 2.   </a:t>
+                <a:ea typeface="Calibri" charset="0"/>
+              </a:rPr>
+              <a:t>Endpoints on the pledge are currently discussed allowing a pledge agent to trigger voucher request generation and enrollment request generation. Generally aligned with BRSKI interaction.</a:t>
             </a:r>
           </a:p>
           <a:p>
@@ -6409,7 +6261,7 @@
                 <a:spcPts val="0"/>
               </a:spcBef>
               <a:spcAft>
-                <a:spcPts val="1000"/>
+                <a:spcPts val="600"/>
               </a:spcAft>
               <a:buClr>
                 <a:srgbClr val="000000"/>
@@ -6418,14 +6270,15 @@
               <a:buChar char="•"/>
             </a:pPr>
             <a:r>
-              <a:rPr lang="en-US" altLang="ko-KR" sz="2200" dirty="0">
+              <a:rPr lang="en-US" altLang="ko-KR" sz="2000" dirty="0">
                 <a:latin typeface="Calibri" charset="0"/>
-              </a:rPr>
-              <a:t>Update of introduction of use case 2 in Section 5.2 to state that the transport between the pledge and the pledge agent will be HTTP in the context of this document but may also be done using other protocols.  Introduction of sub section related to the discovery of pledge and pledge-agent in use case 2 in Section 5.2.4</a:t>
-            </a:r>
-          </a:p>
-          <a:p>
-            <a:pPr>
+                <a:ea typeface="Calibri" charset="0"/>
+              </a:rPr>
+              <a:t>Demand seen for at least four endpoints: </a:t>
+            </a:r>
+          </a:p>
+          <a:p>
+            <a:pPr marL="534988" lvl="1">
               <a:lnSpc>
                 <a:spcPct val="100000"/>
               </a:lnSpc>
@@ -6433,7 +6286,7 @@
                 <a:spcPts val="0"/>
               </a:spcBef>
               <a:spcAft>
-                <a:spcPts val="1000"/>
+                <a:spcPts val="600"/>
               </a:spcAft>
               <a:buClr>
                 <a:srgbClr val="000000"/>
@@ -6442,26 +6295,26 @@
               <a:buChar char="•"/>
             </a:pPr>
             <a:r>
-              <a:rPr lang="en-US" altLang="ko-KR" sz="2200" dirty="0">
+              <a:rPr lang="en-US" altLang="ko-KR" sz="2000" dirty="0">
                 <a:latin typeface="Calibri" charset="0"/>
               </a:rPr>
-              <a:t>Clarification in discovery options for enrollment endpoints at the domain registrar based on well-known endpoints in Section 5.3. Note that the change to /</a:t>
-            </a:r>
-            <a:r>
-              <a:rPr lang="en-US" altLang="ko-KR" sz="2200" dirty="0" err="1">
+              <a:t>/</a:t>
+            </a:r>
+            <a:r>
+              <a:rPr lang="en-US" altLang="ko-KR" sz="2000" dirty="0" err="1">
                 <a:latin typeface="Calibri" charset="0"/>
               </a:rPr>
-              <a:t>brski</a:t>
-            </a:r>
-            <a:r>
-              <a:rPr lang="en-US" altLang="ko-KR" sz="2200" dirty="0">
+              <a:t>triggervoucherrequest</a:t>
+            </a:r>
+            <a:r>
+              <a:rPr lang="en-US" altLang="ko-KR" sz="2000" dirty="0">
                 <a:latin typeface="Calibri" charset="0"/>
               </a:rPr>
-              <a:t> for the voucher related endpoints has been taken over in the BRSKI main document.   </a:t>
-            </a:r>
-          </a:p>
-          <a:p>
-            <a:pPr>
+              <a:t>: initiates pledge(-callee) voucher request creation, potentially with additional information (e.g., registrar certificate), returns pledge(-callee) voucher request  </a:t>
+            </a:r>
+          </a:p>
+          <a:p>
+            <a:pPr marL="534988" lvl="1">
               <a:lnSpc>
                 <a:spcPct val="100000"/>
               </a:lnSpc>
@@ -6469,7 +6322,7 @@
                 <a:spcPts val="0"/>
               </a:spcBef>
               <a:spcAft>
-                <a:spcPts val="1000"/>
+                <a:spcPts val="600"/>
               </a:spcAft>
               <a:buClr>
                 <a:srgbClr val="000000"/>
@@ -6478,18 +6331,198 @@
               <a:buChar char="•"/>
             </a:pPr>
             <a:r>
-              <a:rPr lang="en-US" altLang="ko-KR" sz="2200" dirty="0">
+              <a:rPr lang="en-US" altLang="ko-KR" sz="2000" dirty="0">
                 <a:latin typeface="Calibri" charset="0"/>
               </a:rPr>
-              <a:t>Updated references.</a:t>
-            </a:r>
+              <a:t>/</a:t>
+            </a:r>
+            <a:r>
+              <a:rPr lang="en-US" altLang="ko-KR" sz="2000" dirty="0" err="1">
+                <a:latin typeface="Calibri" charset="0"/>
+              </a:rPr>
+              <a:t>triggerenrollrequest</a:t>
+            </a:r>
+            <a:r>
+              <a:rPr lang="en-US" altLang="ko-KR" sz="2000" dirty="0">
+                <a:latin typeface="Calibri" charset="0"/>
+              </a:rPr>
+              <a:t>: initiates pledge(-callee) certification request creation, returns certification request    </a:t>
+            </a:r>
+          </a:p>
+          <a:p>
+            <a:pPr marL="534988" lvl="1">
+              <a:lnSpc>
+                <a:spcPct val="100000"/>
+              </a:lnSpc>
+              <a:spcBef>
+                <a:spcPts val="0"/>
+              </a:spcBef>
+              <a:spcAft>
+                <a:spcPts val="600"/>
+              </a:spcAft>
+              <a:buClr>
+                <a:srgbClr val="000000"/>
+              </a:buClr>
+              <a:buFont typeface="Arial"/>
+              <a:buChar char="•"/>
+            </a:pPr>
+            <a:r>
+              <a:rPr lang="en-US" altLang="ko-KR" sz="2000" dirty="0">
+                <a:latin typeface="Calibri" charset="0"/>
+              </a:rPr>
+              <a:t>/</a:t>
+            </a:r>
+            <a:r>
+              <a:rPr lang="en-US" altLang="ko-KR" sz="2000" dirty="0" err="1">
+                <a:latin typeface="Calibri" charset="0"/>
+              </a:rPr>
+              <a:t>supplyvoucherresponse</a:t>
+            </a:r>
+            <a:r>
+              <a:rPr lang="en-US" altLang="ko-KR" sz="2000" dirty="0">
+                <a:latin typeface="Calibri" charset="0"/>
+              </a:rPr>
+              <a:t>: provide voucher response to pledge(-callee), returns pledge(-callee) voucher status         </a:t>
+            </a:r>
+          </a:p>
+          <a:p>
+            <a:pPr marL="534988" lvl="1">
+              <a:lnSpc>
+                <a:spcPct val="100000"/>
+              </a:lnSpc>
+              <a:spcBef>
+                <a:spcPts val="0"/>
+              </a:spcBef>
+              <a:spcAft>
+                <a:spcPts val="600"/>
+              </a:spcAft>
+              <a:buClr>
+                <a:srgbClr val="000000"/>
+              </a:buClr>
+              <a:buFont typeface="Arial"/>
+              <a:buChar char="•"/>
+            </a:pPr>
+            <a:r>
+              <a:rPr lang="en-US" altLang="ko-KR" sz="2000" dirty="0">
+                <a:latin typeface="Calibri" charset="0"/>
+              </a:rPr>
+              <a:t>/</a:t>
+            </a:r>
+            <a:r>
+              <a:rPr lang="en-US" altLang="ko-KR" sz="2000" dirty="0" err="1">
+                <a:latin typeface="Calibri" charset="0"/>
+              </a:rPr>
+              <a:t>supplyenrollresponse</a:t>
+            </a:r>
+            <a:r>
+              <a:rPr lang="en-US" altLang="ko-KR" sz="2000" dirty="0">
+                <a:latin typeface="Calibri" charset="0"/>
+              </a:rPr>
+              <a:t>: </a:t>
+            </a:r>
+            <a:r>
+              <a:rPr lang="en-US" altLang="ko-KR" sz="2000">
+                <a:latin typeface="Calibri" charset="0"/>
+              </a:rPr>
+              <a:t>provide domain credentials </a:t>
+            </a:r>
+            <a:r>
+              <a:rPr lang="en-US" altLang="ko-KR" sz="2000" dirty="0">
+                <a:latin typeface="Calibri" charset="0"/>
+              </a:rPr>
+              <a:t>to pledge(-callee), returns enrollment status </a:t>
+            </a:r>
+          </a:p>
+          <a:p>
+            <a:pPr>
+              <a:lnSpc>
+                <a:spcPct val="100000"/>
+              </a:lnSpc>
+              <a:spcBef>
+                <a:spcPts val="0"/>
+              </a:spcBef>
+              <a:spcAft>
+                <a:spcPts val="600"/>
+              </a:spcAft>
+              <a:buClr>
+                <a:srgbClr val="000000"/>
+              </a:buClr>
+              <a:buFont typeface="Arial"/>
+              <a:buChar char="•"/>
+            </a:pPr>
+            <a:r>
+              <a:rPr lang="en-US" altLang="ko-KR" sz="2000" dirty="0">
+                <a:latin typeface="Calibri" charset="0"/>
+                <a:ea typeface="Calibri" charset="0"/>
+              </a:rPr>
+              <a:t>Clarification has to start regarding supported encodings of the objects exchanged:</a:t>
+            </a:r>
+          </a:p>
+          <a:p>
+            <a:pPr lvl="1">
+              <a:lnSpc>
+                <a:spcPct val="100000"/>
+              </a:lnSpc>
+              <a:spcBef>
+                <a:spcPts val="0"/>
+              </a:spcBef>
+              <a:spcAft>
+                <a:spcPts val="600"/>
+              </a:spcAft>
+              <a:buClr>
+                <a:srgbClr val="000000"/>
+              </a:buClr>
+              <a:buFont typeface="Arial"/>
+              <a:buChar char="•"/>
+            </a:pPr>
+            <a:r>
+              <a:rPr lang="en-US" altLang="ko-KR" sz="2000" dirty="0">
+                <a:latin typeface="Calibri" charset="0"/>
+                <a:ea typeface="Calibri" charset="0"/>
+              </a:rPr>
+              <a:t>Current voucher object is CMC-signed-JSON. Discussion on relying on </a:t>
+            </a:r>
+            <a:r>
+              <a:rPr lang="en-US" altLang="ko-KR" sz="2000" dirty="0">
+                <a:latin typeface="Calibri" charset="0"/>
+                <a:ea typeface="Calibri" charset="0"/>
+                <a:sym typeface="Wingdings" panose="05000000000000000000" pitchFamily="2" charset="2"/>
+              </a:rPr>
+              <a:t>JWS-signed-JSON in the first step, would also align with using similar formats for the certification request.</a:t>
+            </a:r>
+            <a:endParaRPr lang="en-US" altLang="ko-KR" sz="2000" dirty="0">
+              <a:latin typeface="Calibri" charset="0"/>
+              <a:ea typeface="Calibri" charset="0"/>
+            </a:endParaRPr>
+          </a:p>
+          <a:p>
+            <a:pPr>
+              <a:lnSpc>
+                <a:spcPct val="100000"/>
+              </a:lnSpc>
+              <a:spcBef>
+                <a:spcPts val="0"/>
+              </a:spcBef>
+              <a:spcAft>
+                <a:spcPts val="600"/>
+              </a:spcAft>
+              <a:buClr>
+                <a:srgbClr val="000000"/>
+              </a:buClr>
+              <a:buFont typeface="Arial"/>
+              <a:buChar char="•"/>
+            </a:pPr>
+            <a:endParaRPr lang="en-US" altLang="ko-KR" sz="2000" dirty="0">
+              <a:latin typeface="Calibri" charset="0"/>
+              <a:ea typeface="Calibri" charset="0"/>
+            </a:endParaRPr>
           </a:p>
         </p:txBody>
       </p:sp>
     </p:spTree>
     <p:extLst>
       <p:ext uri="{BB962C8B-B14F-4D97-AF65-F5344CB8AC3E}">
-        <p14:creationId xmlns:p14="http://schemas.microsoft.com/office/powerpoint/2010/main" val="3841408071"/>
+        <p14:creationId xmlns:p14="http://schemas.microsoft.com/office/powerpoint/2010/main" val="1200939753"/>
       </p:ext>
     </p:extLst>
   </p:cSld>
@@ -6532,7 +6565,12 @@
             <p:ph type="title"/>
           </p:nvPr>
         </p:nvSpPr>
-        <p:spPr/>
+        <p:spPr>
+          <a:xfrm>
+            <a:off x="838200" y="365125"/>
+            <a:ext cx="10516235" cy="1326515"/>
+          </a:xfrm>
+        </p:spPr>
         <p:txBody>
           <a:bodyPr>
             <a:normAutofit/>
@@ -6541,8 +6579,15 @@
           <a:p>
             <a:r>
               <a:rPr lang="en-US" sz="3600" dirty="0"/>
-              <a:t>Discussion, open issues from IETF 108</a:t>
-            </a:r>
+              <a:t>Changes to </a:t>
+            </a:r>
+            <a:r>
+              <a:rPr lang="en-US" sz="3600" dirty="0">
+                <a:sym typeface="Wingdings" panose="05000000000000000000" pitchFamily="2" charset="2"/>
+              </a:rPr>
+              <a:t>IETF draft 00 (not submitted yet)</a:t>
+            </a:r>
+            <a:endParaRPr lang="en-US" sz="3600" dirty="0"/>
           </a:p>
         </p:txBody>
       </p:sp>
@@ -6564,107 +6609,132 @@
         </p:nvSpPr>
         <p:spPr>
           <a:xfrm>
-            <a:off x="701640" y="1727148"/>
-            <a:ext cx="10956960" cy="4648251"/>
+            <a:off x="701675" y="1953739"/>
+            <a:ext cx="10669905" cy="4218461"/>
           </a:xfrm>
         </p:spPr>
         <p:txBody>
-          <a:bodyPr>
+          <a:bodyPr vert="horz" wrap="square" lIns="91440" tIns="45720" rIns="91440" bIns="45720" numCol="1" anchor="t">
             <a:noAutofit/>
           </a:bodyPr>
           <a:lstStyle/>
           <a:p>
-            <a:pPr marL="361950" indent="-361950">
+            <a:pPr>
               <a:lnSpc>
                 <a:spcPct val="100000"/>
               </a:lnSpc>
-              <a:buNone/>
+              <a:spcBef>
+                <a:spcPts val="0"/>
+              </a:spcBef>
+              <a:spcAft>
+                <a:spcPts val="1000"/>
+              </a:spcAft>
+              <a:buClr>
+                <a:srgbClr val="000000"/>
+              </a:buClr>
+              <a:buFont typeface="Arial"/>
+              <a:buChar char="•"/>
             </a:pPr>
             <a:r>
-              <a:rPr lang="en-US" sz="2200" dirty="0"/>
-              <a:t>#1 Discovery of enrollment options on registrar: uses </a:t>
-            </a:r>
-            <a:r>
-              <a:rPr lang="en-US" sz="2000" dirty="0"/>
-              <a:t>“GET / .well-known/” resulting in the enumeration of available endpoints on the domain registrar, so pledge or pledge-agent may pick</a:t>
-            </a:r>
-          </a:p>
-          <a:p>
-            <a:pPr marL="361950" indent="-361950">
+              <a:rPr lang="en-US" sz="2200" dirty="0">
+                <a:latin typeface="Calibri" charset="0"/>
+              </a:rPr>
+              <a:t>Update of scope in Section 3.1 to include that specifically the pledge acts as a receiver in use case 2 (PUSH model). The Pledge(-callee) is receiving requests in the onboarding process in order to get his credentials pushed.</a:t>
+            </a:r>
+            <a:endParaRPr lang="en-US" altLang="ko-KR" sz="2200" dirty="0">
+              <a:latin typeface="Calibri" charset="0"/>
+            </a:endParaRPr>
+          </a:p>
+          <a:p>
+            <a:pPr>
               <a:lnSpc>
                 <a:spcPct val="100000"/>
               </a:lnSpc>
-              <a:buNone/>
+              <a:spcBef>
+                <a:spcPts val="0"/>
+              </a:spcBef>
+              <a:spcAft>
+                <a:spcPts val="1000"/>
+              </a:spcAft>
+              <a:buClr>
+                <a:srgbClr val="000000"/>
+              </a:buClr>
+              <a:buFont typeface="Arial"/>
+              <a:buChar char="•"/>
             </a:pPr>
             <a:r>
-              <a:rPr lang="en-US" sz="2000" dirty="0"/>
-              <a:t>#2 Pledge-agent authentication and authorization in use case 2 towards domain registrar </a:t>
-            </a:r>
-            <a:r>
-              <a:rPr lang="en-US" sz="2000" dirty="0">
-                <a:sym typeface="Wingdings" panose="05000000000000000000" pitchFamily="2" charset="2"/>
-              </a:rPr>
-              <a:t> ongoing discussion in design team</a:t>
-            </a:r>
-          </a:p>
-          <a:p>
-            <a:pPr marL="361950" indent="-361950">
+              <a:rPr lang="en-US" altLang="ko-KR" sz="2200" dirty="0">
+                <a:latin typeface="Calibri" charset="0"/>
+              </a:rPr>
+              <a:t>Update of introduction of use case 2 in Section 5.2 to state that the transport between the pledge and the pledge agent will be HTTP in the context of this document but may also be done using other protocols.  Introduction of sub section related to the discovery of pledge (-callee) and pledge-agent in use case 2 in Section 5.2.4.</a:t>
+            </a:r>
+          </a:p>
+          <a:p>
+            <a:pPr>
               <a:lnSpc>
                 <a:spcPct val="100000"/>
               </a:lnSpc>
-              <a:buNone/>
+              <a:spcBef>
+                <a:spcPts val="0"/>
+              </a:spcBef>
+              <a:spcAft>
+                <a:spcPts val="1000"/>
+              </a:spcAft>
+              <a:buClr>
+                <a:srgbClr val="000000"/>
+              </a:buClr>
+              <a:buFont typeface="Arial"/>
+              <a:buChar char="•"/>
             </a:pPr>
             <a:r>
-              <a:rPr lang="en-US" sz="2000" dirty="0"/>
-              <a:t>#3 Necessity of providing (proximity) registrar certificate to pledge for inclusion into voucher request: current discussion in design team tends to support this to enable registrar to verify that he is the target registrar</a:t>
-            </a:r>
-          </a:p>
-          <a:p>
-            <a:pPr marL="361950" indent="-361950">
+              <a:rPr lang="en-US" altLang="ko-KR" sz="2200" dirty="0">
+                <a:latin typeface="Calibri" charset="0"/>
+              </a:rPr>
+              <a:t>Clarification in discovery options for enrollment endpoints at the domain registrar based on well-known endpoints in Section 5.3. Note that the change to /</a:t>
+            </a:r>
+            <a:r>
+              <a:rPr lang="en-US" altLang="ko-KR" sz="2200" dirty="0" err="1">
+                <a:latin typeface="Calibri" charset="0"/>
+              </a:rPr>
+              <a:t>brski</a:t>
+            </a:r>
+            <a:r>
+              <a:rPr lang="en-US" altLang="ko-KR" sz="2200" dirty="0">
+                <a:latin typeface="Calibri" charset="0"/>
+              </a:rPr>
+              <a:t> for the voucher related endpoints has been taken over in the BRSKI main document.   </a:t>
+            </a:r>
+          </a:p>
+          <a:p>
+            <a:pPr>
               <a:lnSpc>
                 <a:spcPct val="100000"/>
               </a:lnSpc>
-              <a:buNone/>
+              <a:spcBef>
+                <a:spcPts val="0"/>
+              </a:spcBef>
+              <a:spcAft>
+                <a:spcPts val="1000"/>
+              </a:spcAft>
+              <a:buClr>
+                <a:srgbClr val="000000"/>
+              </a:buClr>
+              <a:buFont typeface="Arial"/>
+              <a:buChar char="•"/>
             </a:pPr>
             <a:r>
-              <a:rPr lang="en-US" sz="2000" dirty="0"/>
-              <a:t>#4 Consideration of different transport options in the addressing scheme for the enrollment protocol: current draft assumed to follow the BRSKI approach (HTTP)</a:t>
-            </a:r>
-            <a:endParaRPr lang="en-US" sz="2000" dirty="0">
-              <a:sym typeface="Wingdings" panose="05000000000000000000" pitchFamily="2" charset="2"/>
-            </a:endParaRPr>
-          </a:p>
-          <a:p>
-            <a:pPr marL="0" indent="0">
-              <a:lnSpc>
-                <a:spcPct val="100000"/>
-              </a:lnSpc>
-              <a:buNone/>
-            </a:pPr>
-            <a:endParaRPr lang="en-US" sz="2000" dirty="0"/>
-          </a:p>
-          <a:p>
-            <a:pPr lvl="1">
-              <a:lnSpc>
-                <a:spcPct val="100000"/>
-              </a:lnSpc>
-            </a:pPr>
-            <a:endParaRPr lang="en-US" sz="2000" dirty="0"/>
-          </a:p>
-          <a:p>
-            <a:pPr>
-              <a:lnSpc>
-                <a:spcPct val="100000"/>
-              </a:lnSpc>
-            </a:pPr>
-            <a:endParaRPr lang="en-US" sz="2000" dirty="0"/>
+              <a:rPr lang="en-US" altLang="ko-KR" sz="2200" dirty="0">
+                <a:latin typeface="Calibri" charset="0"/>
+              </a:rPr>
+              <a:t>Updated references.</a:t>
+            </a:r>
           </a:p>
         </p:txBody>
       </p:sp>
     </p:spTree>
     <p:extLst>
       <p:ext uri="{BB962C8B-B14F-4D97-AF65-F5344CB8AC3E}">
-        <p14:creationId xmlns:p14="http://schemas.microsoft.com/office/powerpoint/2010/main" val="2717347751"/>
+        <p14:creationId xmlns:p14="http://schemas.microsoft.com/office/powerpoint/2010/main" val="3841408071"/>
       </p:ext>
     </p:extLst>
   </p:cSld>
@@ -6716,6 +6786,181 @@
           <a:p>
             <a:r>
               <a:rPr lang="en-US" sz="3600" dirty="0"/>
+              <a:t>Discussion, open issues from IETF 108</a:t>
+            </a:r>
+          </a:p>
+        </p:txBody>
+      </p:sp>
+      <p:sp>
+        <p:nvSpPr>
+          <p:cNvPr id="3" name="Content Placeholder 2">
+            <a:extLst>
+              <a:ext uri="{FF2B5EF4-FFF2-40B4-BE49-F238E27FC236}">
+                <a16:creationId xmlns:a16="http://schemas.microsoft.com/office/drawing/2014/main" id="{A9776AB7-EF6B-4831-BA5E-A2298E1B08F8}"/>
+              </a:ext>
+            </a:extLst>
+          </p:cNvPr>
+          <p:cNvSpPr>
+            <a:spLocks noGrp="1"/>
+          </p:cNvSpPr>
+          <p:nvPr>
+            <p:ph idx="1"/>
+          </p:nvPr>
+        </p:nvSpPr>
+        <p:spPr>
+          <a:xfrm>
+            <a:off x="701640" y="1727148"/>
+            <a:ext cx="10956960" cy="4648251"/>
+          </a:xfrm>
+        </p:spPr>
+        <p:txBody>
+          <a:bodyPr>
+            <a:noAutofit/>
+          </a:bodyPr>
+          <a:lstStyle/>
+          <a:p>
+            <a:pPr marL="361950" indent="-361950">
+              <a:lnSpc>
+                <a:spcPct val="100000"/>
+              </a:lnSpc>
+              <a:buNone/>
+            </a:pPr>
+            <a:r>
+              <a:rPr lang="en-US" sz="2200" dirty="0"/>
+              <a:t>#1 Discovery of enrollment options on registrar: uses </a:t>
+            </a:r>
+            <a:r>
+              <a:rPr lang="en-US" sz="2000" dirty="0"/>
+              <a:t>“GET / .well-known/” resulting in the enumeration of available endpoints on the domain registrar, so pledge or pledge-agent may pick</a:t>
+            </a:r>
+          </a:p>
+          <a:p>
+            <a:pPr marL="361950" indent="-361950">
+              <a:lnSpc>
+                <a:spcPct val="100000"/>
+              </a:lnSpc>
+              <a:buNone/>
+            </a:pPr>
+            <a:r>
+              <a:rPr lang="en-US" sz="2000" dirty="0"/>
+              <a:t>#2 Pledge-agent authentication and authorization in use case 2 PUSH towards domain registrar </a:t>
+            </a:r>
+            <a:r>
+              <a:rPr lang="en-US" sz="2000" dirty="0">
+                <a:sym typeface="Wingdings" panose="05000000000000000000" pitchFamily="2" charset="2"/>
+              </a:rPr>
+              <a:t> ongoing discussion in design team</a:t>
+            </a:r>
+          </a:p>
+          <a:p>
+            <a:pPr marL="361950" indent="-361950">
+              <a:lnSpc>
+                <a:spcPct val="100000"/>
+              </a:lnSpc>
+              <a:buNone/>
+            </a:pPr>
+            <a:r>
+              <a:rPr lang="en-US" sz="2000" dirty="0"/>
+              <a:t>#3 Necessity of providing (proximity) registrar certificate to pledge for inclusion into voucher request: current discussion in design team tends to support this to enable registrar to verify that he is the target registrar</a:t>
+            </a:r>
+          </a:p>
+          <a:p>
+            <a:pPr marL="361950" indent="-361950">
+              <a:lnSpc>
+                <a:spcPct val="100000"/>
+              </a:lnSpc>
+              <a:buNone/>
+            </a:pPr>
+            <a:r>
+              <a:rPr lang="en-US" sz="2000" dirty="0"/>
+              <a:t>#4 Consideration of different transport options in the addressing scheme for the enrollment protocol: current draft assumed to follow the BRSKI approach (HTTP)</a:t>
+            </a:r>
+            <a:endParaRPr lang="en-US" sz="2000" dirty="0">
+              <a:sym typeface="Wingdings" panose="05000000000000000000" pitchFamily="2" charset="2"/>
+            </a:endParaRPr>
+          </a:p>
+          <a:p>
+            <a:pPr marL="0" indent="0">
+              <a:lnSpc>
+                <a:spcPct val="100000"/>
+              </a:lnSpc>
+              <a:buNone/>
+            </a:pPr>
+            <a:endParaRPr lang="en-US" sz="2000" dirty="0"/>
+          </a:p>
+          <a:p>
+            <a:pPr lvl="1">
+              <a:lnSpc>
+                <a:spcPct val="100000"/>
+              </a:lnSpc>
+            </a:pPr>
+            <a:endParaRPr lang="en-US" sz="2000" dirty="0"/>
+          </a:p>
+          <a:p>
+            <a:pPr>
+              <a:lnSpc>
+                <a:spcPct val="100000"/>
+              </a:lnSpc>
+            </a:pPr>
+            <a:endParaRPr lang="en-US" sz="2000" dirty="0"/>
+          </a:p>
+        </p:txBody>
+      </p:sp>
+    </p:spTree>
+    <p:extLst>
+      <p:ext uri="{BB962C8B-B14F-4D97-AF65-F5344CB8AC3E}">
+        <p14:creationId xmlns:p14="http://schemas.microsoft.com/office/powerpoint/2010/main" val="2717347751"/>
+      </p:ext>
+    </p:extLst>
+  </p:cSld>
+  <p:clrMapOvr>
+    <a:masterClrMapping/>
+  </p:clrMapOvr>
+</p:sld>
+</file>
+
+<file path=ppt/slides/slide9.xml><?xml version="1.0" encoding="utf-8"?>
+<p:sld xmlns:a="http://schemas.openxmlformats.org/drawingml/2006/main" xmlns:r="http://schemas.openxmlformats.org/officeDocument/2006/relationships" xmlns:p="http://schemas.openxmlformats.org/presentationml/2006/main">
+  <p:cSld>
+    <p:spTree>
+      <p:nvGrpSpPr>
+        <p:cNvPr id="1" name=""/>
+        <p:cNvGrpSpPr/>
+        <p:nvPr/>
+      </p:nvGrpSpPr>
+      <p:grpSpPr>
+        <a:xfrm>
+          <a:off x="0" y="0"/>
+          <a:ext cx="0" cy="0"/>
+          <a:chOff x="0" y="0"/>
+          <a:chExt cx="0" cy="0"/>
+        </a:xfrm>
+      </p:grpSpPr>
+      <p:sp>
+        <p:nvSpPr>
+          <p:cNvPr id="2" name="Title 1">
+            <a:extLst>
+              <a:ext uri="{FF2B5EF4-FFF2-40B4-BE49-F238E27FC236}">
+                <a16:creationId xmlns:a16="http://schemas.microsoft.com/office/drawing/2014/main" id="{67612D3D-95B0-4F74-BDB2-BCE058A01C12}"/>
+              </a:ext>
+            </a:extLst>
+          </p:cNvPr>
+          <p:cNvSpPr>
+            <a:spLocks noGrp="1"/>
+          </p:cNvSpPr>
+          <p:nvPr>
+            <p:ph type="title"/>
+          </p:nvPr>
+        </p:nvSpPr>
+        <p:spPr/>
+        <p:txBody>
+          <a:bodyPr>
+            <a:normAutofit/>
+          </a:bodyPr>
+          <a:lstStyle/>
+          <a:p>
+            <a:r>
+              <a:rPr lang="en-US" sz="3600" dirty="0"/>
               <a:t>Next Steps</a:t>
             </a:r>
           </a:p>
@@ -6756,7 +7001,7 @@
             </a:pPr>
             <a:r>
               <a:rPr lang="en-US" sz="2200" dirty="0"/>
-              <a:t>Further refinement of the approach in the design team </a:t>
+              <a:t>Further refinement of the PUSH approach in the design team addressing the open issues </a:t>
             </a:r>
           </a:p>
           <a:p>

</xml_diff>